<commit_message>
5.9 and 5.10 further review
</commit_message>
<xml_diff>
--- a/units/5/lessons/9/resources/petascale-lesson-5.9-slides.pptx
+++ b/units/5/lessons/9/resources/petascale-lesson-5.9-slides.pptx
@@ -267,6 +267,96 @@
     </p:ext>
   </p:extLst>
 </p:presentation>
+</file>
+
+<file path=ppt/revisionInfo.xml><?xml version="1.0" encoding="utf-8"?>
+<p1510:revInfo xmlns:a="http://schemas.openxmlformats.org/drawingml/2006/main" xmlns:r="http://schemas.openxmlformats.org/officeDocument/2006/relationships" xmlns:p1510="http://schemas.microsoft.com/office/powerpoint/2015/10/main">
+  <p1510:revLst>
+    <p1510:client id="{865E6047-ED28-466F-8EB1-2FBEF163888C}" v="4" dt="2020-12-03T19:52:35.927"/>
+  </p1510:revLst>
+</p1510:revInfo>
+</file>
+
+<file path=ppt/changesInfos/changesInfo1.xml><?xml version="1.0" encoding="utf-8"?>
+<pc:chgInfo xmlns:a="http://schemas.openxmlformats.org/drawingml/2006/main" xmlns:r="http://schemas.openxmlformats.org/officeDocument/2006/relationships" xmlns:ac="http://schemas.microsoft.com/office/drawing/2013/main/command" xmlns:pc="http://schemas.microsoft.com/office/powerpoint/2013/main/command">
+  <pc:docChgLst>
+    <pc:chgData name="Magik Home" userId="68ebee5321e2cff8" providerId="LiveId" clId="{865E6047-ED28-466F-8EB1-2FBEF163888C}"/>
+    <pc:docChg chg="undo custSel modSld">
+      <pc:chgData name="Magik Home" userId="68ebee5321e2cff8" providerId="LiveId" clId="{865E6047-ED28-466F-8EB1-2FBEF163888C}" dt="2020-12-03T19:52:35.927" v="22"/>
+      <pc:docMkLst>
+        <pc:docMk/>
+      </pc:docMkLst>
+      <pc:sldChg chg="addSp modSp mod">
+        <pc:chgData name="Magik Home" userId="68ebee5321e2cff8" providerId="LiveId" clId="{865E6047-ED28-466F-8EB1-2FBEF163888C}" dt="2020-12-03T19:52:20.407" v="19" actId="14100"/>
+        <pc:sldMkLst>
+          <pc:docMk/>
+          <pc:sldMk cId="0" sldId="258"/>
+        </pc:sldMkLst>
+        <pc:spChg chg="add mod">
+          <ac:chgData name="Magik Home" userId="68ebee5321e2cff8" providerId="LiveId" clId="{865E6047-ED28-466F-8EB1-2FBEF163888C}" dt="2020-12-03T19:52:20.407" v="19" actId="14100"/>
+          <ac:spMkLst>
+            <pc:docMk/>
+            <pc:sldMk cId="0" sldId="258"/>
+            <ac:spMk id="6" creationId="{316ADF4D-8BCA-4120-A9A4-2C6A79074190}"/>
+          </ac:spMkLst>
+        </pc:spChg>
+        <pc:spChg chg="mod">
+          <ac:chgData name="Magik Home" userId="68ebee5321e2cff8" providerId="LiveId" clId="{865E6047-ED28-466F-8EB1-2FBEF163888C}" dt="2020-12-03T19:51:29.676" v="1"/>
+          <ac:spMkLst>
+            <pc:docMk/>
+            <pc:sldMk cId="0" sldId="258"/>
+            <ac:spMk id="67" creationId="{00000000-0000-0000-0000-000000000000}"/>
+          </ac:spMkLst>
+        </pc:spChg>
+      </pc:sldChg>
+      <pc:sldChg chg="addSp modSp modNotes">
+        <pc:chgData name="Magik Home" userId="68ebee5321e2cff8" providerId="LiveId" clId="{865E6047-ED28-466F-8EB1-2FBEF163888C}" dt="2020-12-03T19:52:25.321" v="20"/>
+        <pc:sldMkLst>
+          <pc:docMk/>
+          <pc:sldMk cId="0" sldId="260"/>
+        </pc:sldMkLst>
+        <pc:spChg chg="add mod">
+          <ac:chgData name="Magik Home" userId="68ebee5321e2cff8" providerId="LiveId" clId="{865E6047-ED28-466F-8EB1-2FBEF163888C}" dt="2020-12-03T19:52:25.321" v="20"/>
+          <ac:spMkLst>
+            <pc:docMk/>
+            <pc:sldMk cId="0" sldId="260"/>
+            <ac:spMk id="5" creationId="{180D12F1-0596-4F0F-BE56-370C50883DC0}"/>
+          </ac:spMkLst>
+        </pc:spChg>
+      </pc:sldChg>
+      <pc:sldChg chg="addSp modSp modNotes">
+        <pc:chgData name="Magik Home" userId="68ebee5321e2cff8" providerId="LiveId" clId="{865E6047-ED28-466F-8EB1-2FBEF163888C}" dt="2020-12-03T19:52:32.760" v="21"/>
+        <pc:sldMkLst>
+          <pc:docMk/>
+          <pc:sldMk cId="0" sldId="262"/>
+        </pc:sldMkLst>
+        <pc:spChg chg="add mod">
+          <ac:chgData name="Magik Home" userId="68ebee5321e2cff8" providerId="LiveId" clId="{865E6047-ED28-466F-8EB1-2FBEF163888C}" dt="2020-12-03T19:52:32.760" v="21"/>
+          <ac:spMkLst>
+            <pc:docMk/>
+            <pc:sldMk cId="0" sldId="262"/>
+            <ac:spMk id="5" creationId="{528C7722-3037-4A0E-8545-D50BEA32A002}"/>
+          </ac:spMkLst>
+        </pc:spChg>
+      </pc:sldChg>
+      <pc:sldChg chg="addSp modSp modNotes">
+        <pc:chgData name="Magik Home" userId="68ebee5321e2cff8" providerId="LiveId" clId="{865E6047-ED28-466F-8EB1-2FBEF163888C}" dt="2020-12-03T19:52:35.927" v="22"/>
+        <pc:sldMkLst>
+          <pc:docMk/>
+          <pc:sldMk cId="0" sldId="264"/>
+        </pc:sldMkLst>
+        <pc:spChg chg="add mod">
+          <ac:chgData name="Magik Home" userId="68ebee5321e2cff8" providerId="LiveId" clId="{865E6047-ED28-466F-8EB1-2FBEF163888C}" dt="2020-12-03T19:52:35.927" v="22"/>
+          <ac:spMkLst>
+            <pc:docMk/>
+            <pc:sldMk cId="0" sldId="264"/>
+            <ac:spMk id="5" creationId="{2047C09E-3B29-41D0-BAA8-158FCDAC9CDD}"/>
+          </ac:spMkLst>
+        </pc:spChg>
+      </pc:sldChg>
+    </pc:docChg>
+  </pc:docChgLst>
+</pc:chgInfo>
 </file>
 
 <file path=ppt/notesMasters/notesMaster1.xml><?xml version="1.0" encoding="utf-8"?>
@@ -928,7 +1018,7 @@
         </p:nvSpPr>
         <p:spPr>
           <a:xfrm>
-            <a:off x="381300" y="685800"/>
+            <a:off x="381000" y="685800"/>
             <a:ext cx="6096000" cy="3429000"/>
           </a:xfrm>
           <a:custGeom>
@@ -1136,7 +1226,7 @@
         </p:nvSpPr>
         <p:spPr>
           <a:xfrm>
-            <a:off x="381300" y="685800"/>
+            <a:off x="381000" y="685800"/>
             <a:ext cx="6096000" cy="3429000"/>
           </a:xfrm>
           <a:custGeom>
@@ -1344,7 +1434,7 @@
         </p:nvSpPr>
         <p:spPr>
           <a:xfrm>
-            <a:off x="381300" y="685800"/>
+            <a:off x="381000" y="685800"/>
             <a:ext cx="6096000" cy="3429000"/>
           </a:xfrm>
           <a:custGeom>
@@ -1552,7 +1642,7 @@
         </p:nvSpPr>
         <p:spPr>
           <a:xfrm>
-            <a:off x="381300" y="685800"/>
+            <a:off x="381000" y="685800"/>
             <a:ext cx="6096000" cy="3429000"/>
           </a:xfrm>
           <a:custGeom>
@@ -6428,14 +6518,6 @@
               </a:rPr>
               <a:t>Blue Waters Petascale Semester Curriculum v1.0</a:t>
             </a:r>
-            <a:r>
-              <a:rPr lang="en-US" sz="2700" dirty="0">
-                <a:latin typeface="Times New Roman" charset="0"/>
-                <a:ea typeface="Times New Roman" charset="0"/>
-                <a:cs typeface="Times New Roman" charset="0"/>
-              </a:rPr>
-              <a:t/>
-            </a:r>
             <a:br>
               <a:rPr lang="en-US" sz="2700" dirty="0">
                 <a:latin typeface="Times New Roman" charset="0"/>
@@ -6451,14 +6533,6 @@
               </a:rPr>
               <a:t>Unit 5: MPI</a:t>
             </a:r>
-            <a:r>
-              <a:rPr lang="en-US" sz="2700" dirty="0">
-                <a:latin typeface="Times New Roman" charset="0"/>
-                <a:ea typeface="Times New Roman" charset="0"/>
-                <a:cs typeface="Times New Roman" charset="0"/>
-              </a:rPr>
-              <a:t/>
-            </a:r>
             <a:br>
               <a:rPr lang="en-US" sz="2700" dirty="0">
                 <a:latin typeface="Times New Roman" charset="0"/>
@@ -6472,23 +6546,7 @@
                 <a:ea typeface="Times New Roman" charset="0"/>
                 <a:cs typeface="Times New Roman" charset="0"/>
               </a:rPr>
-              <a:t>Lesson </a:t>
-            </a:r>
-            <a:r>
-              <a:rPr lang="en-US" sz="2700" b="1" dirty="0" smtClean="0">
-                <a:latin typeface="Times New Roman" charset="0"/>
-                <a:ea typeface="Times New Roman" charset="0"/>
-                <a:cs typeface="Times New Roman" charset="0"/>
-              </a:rPr>
-              <a:t>9</a:t>
-            </a:r>
-            <a:r>
-              <a:rPr lang="en-US" sz="2700" b="1" dirty="0">
-                <a:latin typeface="Times New Roman" charset="0"/>
-                <a:ea typeface="Times New Roman" charset="0"/>
-                <a:cs typeface="Times New Roman" charset="0"/>
-              </a:rPr>
-              <a:t>: Hello World</a:t>
+              <a:t>Lesson 9: Hello World</a:t>
             </a:r>
             <a:br>
               <a:rPr lang="en-US" sz="2700" b="1" dirty="0">
@@ -6533,13 +6591,6 @@
   <p:clrMapOvr>
     <a:masterClrMapping/>
   </p:clrMapOvr>
-  <p:timing>
-    <p:tnLst>
-      <p:par>
-        <p:cTn id="1" dur="indefinite" restart="never" nodeType="tmRoot"/>
-      </p:par>
-    </p:tnLst>
-  </p:timing>
 </p:sld>
 </file>
 
@@ -6757,6 +6808,66 @@
           </a:ln>
         </p:spPr>
       </p:pic>
+      <p:sp>
+        <p:nvSpPr>
+          <p:cNvPr id="5" name="TextBox 4">
+            <a:extLst>
+              <a:ext uri="{FF2B5EF4-FFF2-40B4-BE49-F238E27FC236}">
+                <a16:creationId xmlns:a16="http://schemas.microsoft.com/office/drawing/2014/main" id="{2047C09E-3B29-41D0-BAA8-158FCDAC9CDD}"/>
+              </a:ext>
+            </a:extLst>
+          </p:cNvPr>
+          <p:cNvSpPr txBox="1"/>
+          <p:nvPr/>
+        </p:nvSpPr>
+        <p:spPr>
+          <a:xfrm>
+            <a:off x="2232837" y="4788687"/>
+            <a:ext cx="6911163" cy="307777"/>
+          </a:xfrm>
+          <a:prstGeom prst="rect">
+            <a:avLst/>
+          </a:prstGeom>
+          <a:noFill/>
+        </p:spPr>
+        <p:txBody>
+          <a:bodyPr wrap="square">
+            <a:spAutoFit/>
+          </a:bodyPr>
+          <a:lstStyle/>
+          <a:p>
+            <a:pPr lvl="0" algn="ctr"/>
+            <a:r>
+              <a:rPr lang="en-US" sz="1400" dirty="0">
+                <a:latin typeface="Roboto"/>
+                <a:ea typeface="Roboto"/>
+                <a:cs typeface="Roboto"/>
+                <a:sym typeface="Roboto"/>
+              </a:rPr>
+              <a:t>Image of Monitor: </a:t>
+            </a:r>
+            <a:r>
+              <a:rPr lang="en-US" sz="1400" dirty="0">
+                <a:latin typeface="Roboto"/>
+                <a:ea typeface="Roboto"/>
+                <a:cs typeface="Roboto"/>
+                <a:sym typeface="Roboto"/>
+                <a:hlinkClick r:id="rId4"/>
+              </a:rPr>
+              <a:t>Monitor Screen Flat LCD Black Drawing</a:t>
+            </a:r>
+            <a:r>
+              <a:rPr lang="en-US" sz="1400" dirty="0">
+                <a:latin typeface="Roboto"/>
+                <a:ea typeface="Roboto"/>
+                <a:cs typeface="Roboto"/>
+                <a:sym typeface="Roboto"/>
+              </a:rPr>
+              <a:t> is in the public domain.</a:t>
+            </a:r>
+          </a:p>
+        </p:txBody>
+      </p:sp>
     </p:spTree>
   </p:cSld>
   <p:clrMapOvr>
@@ -6841,23 +6952,7 @@
                 <a:ea typeface="Times New Roman" charset="0"/>
                 <a:cs typeface="Times New Roman" charset="0"/>
               </a:rPr>
-              <a:t>CC </a:t>
-            </a:r>
-            <a:r>
-              <a:rPr lang="en-US" sz="2100" dirty="0" smtClean="0">
-                <a:latin typeface="Times New Roman" charset="0"/>
-                <a:ea typeface="Times New Roman" charset="0"/>
-                <a:cs typeface="Times New Roman" charset="0"/>
-              </a:rPr>
-              <a:t>BY-SA </a:t>
-            </a:r>
-            <a:r>
-              <a:rPr lang="en-US" sz="2100" dirty="0">
-                <a:latin typeface="Times New Roman" charset="0"/>
-                <a:ea typeface="Times New Roman" charset="0"/>
-                <a:cs typeface="Times New Roman" charset="0"/>
-              </a:rPr>
-              <a:t>4.0. To view a copy of this license, visit </a:t>
+              <a:t>CC BY-SA 4.0. To view a copy of this license, visit </a:t>
             </a:r>
             <a:r>
               <a:rPr lang="en-US" sz="2100" dirty="0">
@@ -6866,24 +6961,7 @@
                 <a:cs typeface="Times New Roman" charset="0"/>
                 <a:hlinkClick r:id="rId2"/>
               </a:rPr>
-              <a:t>https://</a:t>
-            </a:r>
-            <a:r>
-              <a:rPr lang="en-US" sz="2100" dirty="0" smtClean="0">
-                <a:latin typeface="Times New Roman" charset="0"/>
-                <a:ea typeface="Times New Roman" charset="0"/>
-                <a:cs typeface="Times New Roman" charset="0"/>
-                <a:hlinkClick r:id="rId2"/>
-              </a:rPr>
-              <a:t>creativecommons.org/licenses/by-sa/4.0</a:t>
-            </a:r>
-            <a:r>
-              <a:rPr lang="en-US" sz="2100" dirty="0">
-                <a:latin typeface="Times New Roman" charset="0"/>
-                <a:ea typeface="Times New Roman" charset="0"/>
-                <a:cs typeface="Times New Roman" charset="0"/>
-              </a:rPr>
-              <a:t/>
+              <a:t>https://creativecommons.org/licenses/by-sa/4.0</a:t>
             </a:r>
             <a:br>
               <a:rPr lang="en-US" sz="2100" dirty="0">
@@ -6892,14 +6970,6 @@
                 <a:cs typeface="Times New Roman" charset="0"/>
               </a:rPr>
             </a:br>
-            <a:r>
-              <a:rPr lang="en-US" sz="2100" dirty="0">
-                <a:latin typeface="Times New Roman" charset="0"/>
-                <a:ea typeface="Times New Roman" charset="0"/>
-                <a:cs typeface="Times New Roman" charset="0"/>
-              </a:rPr>
-              <a:t/>
-            </a:r>
             <a:br>
               <a:rPr lang="en-US" sz="2100" dirty="0">
                 <a:latin typeface="Times New Roman" charset="0"/>
@@ -6924,14 +6994,6 @@
               </a:rPr>
               <a:t>http://shodor.org/petascale/materials/semester-curriculum</a:t>
             </a:r>
-            <a:r>
-              <a:rPr lang="en-US" sz="2100" dirty="0">
-                <a:latin typeface="Times New Roman" charset="0"/>
-                <a:ea typeface="Times New Roman" charset="0"/>
-                <a:cs typeface="Times New Roman" charset="0"/>
-              </a:rPr>
-              <a:t/>
-            </a:r>
             <a:br>
               <a:rPr lang="en-US" sz="2100" dirty="0">
                 <a:latin typeface="Times New Roman" charset="0"/>
@@ -6939,14 +7001,6 @@
                 <a:cs typeface="Times New Roman" charset="0"/>
               </a:rPr>
             </a:br>
-            <a:r>
-              <a:rPr lang="en-US" sz="2100" dirty="0">
-                <a:latin typeface="Times New Roman" charset="0"/>
-                <a:ea typeface="Times New Roman" charset="0"/>
-                <a:cs typeface="Times New Roman" charset="0"/>
-              </a:rPr>
-              <a:t/>
-            </a:r>
             <a:br>
               <a:rPr lang="en-US" sz="2100" dirty="0">
                 <a:latin typeface="Times New Roman" charset="0"/>
@@ -6971,14 +7025,6 @@
               </a:rPr>
               <a:t>https://github.com/shodor-education/petascale-semester-curriculum</a:t>
             </a:r>
-            <a:r>
-              <a:rPr lang="en-US" sz="2100" dirty="0">
-                <a:latin typeface="Times New Roman" charset="0"/>
-                <a:ea typeface="Times New Roman" charset="0"/>
-                <a:cs typeface="Times New Roman" charset="0"/>
-              </a:rPr>
-              <a:t/>
-            </a:r>
             <a:br>
               <a:rPr lang="en-US" sz="2100" dirty="0">
                 <a:latin typeface="Times New Roman" charset="0"/>
@@ -6986,14 +7032,6 @@
                 <a:cs typeface="Times New Roman" charset="0"/>
               </a:rPr>
             </a:br>
-            <a:r>
-              <a:rPr lang="en-US" sz="2100" dirty="0">
-                <a:latin typeface="Times New Roman" charset="0"/>
-                <a:ea typeface="Times New Roman" charset="0"/>
-                <a:cs typeface="Times New Roman" charset="0"/>
-              </a:rPr>
-              <a:t/>
-            </a:r>
             <a:br>
               <a:rPr lang="en-US" sz="2100" dirty="0">
                 <a:latin typeface="Times New Roman" charset="0"/>
@@ -7260,10 +7298,10 @@
               <a:buNone/>
             </a:pPr>
             <a:r>
-              <a:rPr lang="en"/>
+              <a:rPr lang="en" dirty="0"/>
               <a:t>Your code will go to every process so it must tell each process what it should do!</a:t>
             </a:r>
-            <a:endParaRPr/>
+            <a:endParaRPr dirty="0"/>
           </a:p>
           <a:p>
             <a:pPr marL="0" lvl="0" indent="0" algn="l" rtl="0">
@@ -7275,7 +7313,7 @@
               </a:spcAft>
               <a:buNone/>
             </a:pPr>
-            <a:endParaRPr/>
+            <a:endParaRPr dirty="0"/>
           </a:p>
           <a:p>
             <a:pPr marL="0" lvl="0" indent="0" algn="l" rtl="0">
@@ -7287,7 +7325,7 @@
               </a:spcAft>
               <a:buNone/>
             </a:pPr>
-            <a:endParaRPr/>
+            <a:endParaRPr dirty="0"/>
           </a:p>
           <a:p>
             <a:pPr marL="0" lvl="0" indent="0" algn="l" rtl="0">
@@ -7299,7 +7337,7 @@
               </a:spcAft>
               <a:buNone/>
             </a:pPr>
-            <a:endParaRPr/>
+            <a:endParaRPr dirty="0"/>
           </a:p>
           <a:p>
             <a:pPr marL="0" lvl="0" indent="0" algn="l" rtl="0">
@@ -7311,7 +7349,7 @@
               </a:spcAft>
               <a:buNone/>
             </a:pPr>
-            <a:endParaRPr/>
+            <a:endParaRPr dirty="0"/>
           </a:p>
           <a:p>
             <a:pPr marL="0" lvl="0" indent="0" algn="l" rtl="0">
@@ -7323,7 +7361,7 @@
               </a:spcAft>
               <a:buNone/>
             </a:pPr>
-            <a:endParaRPr/>
+            <a:endParaRPr dirty="0"/>
           </a:p>
           <a:p>
             <a:pPr marL="0" lvl="0" indent="0" algn="l" rtl="0">
@@ -7336,10 +7374,9 @@
               <a:buNone/>
             </a:pPr>
             <a:r>
-              <a:rPr lang="en"/>
+              <a:rPr lang="en-US" dirty="0"/>
               <a:t>As a result the program needs to differentiate each process</a:t>
             </a:r>
-            <a:endParaRPr/>
           </a:p>
         </p:txBody>
       </p:sp>
@@ -7371,6 +7408,66 @@
           </a:ln>
         </p:spPr>
       </p:pic>
+      <p:sp>
+        <p:nvSpPr>
+          <p:cNvPr id="6" name="TextBox 5">
+            <a:extLst>
+              <a:ext uri="{FF2B5EF4-FFF2-40B4-BE49-F238E27FC236}">
+                <a16:creationId xmlns:a16="http://schemas.microsoft.com/office/drawing/2014/main" id="{316ADF4D-8BCA-4120-A9A4-2C6A79074190}"/>
+              </a:ext>
+            </a:extLst>
+          </p:cNvPr>
+          <p:cNvSpPr txBox="1"/>
+          <p:nvPr/>
+        </p:nvSpPr>
+        <p:spPr>
+          <a:xfrm>
+            <a:off x="2232837" y="4788687"/>
+            <a:ext cx="6911163" cy="307777"/>
+          </a:xfrm>
+          <a:prstGeom prst="rect">
+            <a:avLst/>
+          </a:prstGeom>
+          <a:noFill/>
+        </p:spPr>
+        <p:txBody>
+          <a:bodyPr wrap="square">
+            <a:spAutoFit/>
+          </a:bodyPr>
+          <a:lstStyle/>
+          <a:p>
+            <a:pPr lvl="0" algn="ctr"/>
+            <a:r>
+              <a:rPr lang="en-US" sz="1400" dirty="0">
+                <a:latin typeface="Roboto"/>
+                <a:ea typeface="Roboto"/>
+                <a:cs typeface="Roboto"/>
+                <a:sym typeface="Roboto"/>
+              </a:rPr>
+              <a:t>Image of Monitor: </a:t>
+            </a:r>
+            <a:r>
+              <a:rPr lang="en-US" sz="1400" dirty="0">
+                <a:latin typeface="Roboto"/>
+                <a:ea typeface="Roboto"/>
+                <a:cs typeface="Roboto"/>
+                <a:sym typeface="Roboto"/>
+                <a:hlinkClick r:id="rId4"/>
+              </a:rPr>
+              <a:t>Monitor Screen Flat LCD Black Drawing</a:t>
+            </a:r>
+            <a:r>
+              <a:rPr lang="en-US" sz="1400" dirty="0">
+                <a:latin typeface="Roboto"/>
+                <a:ea typeface="Roboto"/>
+                <a:cs typeface="Roboto"/>
+                <a:sym typeface="Roboto"/>
+              </a:rPr>
+              <a:t> is in the public domain.</a:t>
+            </a:r>
+          </a:p>
+        </p:txBody>
+      </p:sp>
     </p:spTree>
   </p:cSld>
   <p:clrMapOvr>
@@ -7774,6 +7871,66 @@
           </a:ln>
         </p:spPr>
       </p:pic>
+      <p:sp>
+        <p:nvSpPr>
+          <p:cNvPr id="5" name="TextBox 4">
+            <a:extLst>
+              <a:ext uri="{FF2B5EF4-FFF2-40B4-BE49-F238E27FC236}">
+                <a16:creationId xmlns:a16="http://schemas.microsoft.com/office/drawing/2014/main" id="{180D12F1-0596-4F0F-BE56-370C50883DC0}"/>
+              </a:ext>
+            </a:extLst>
+          </p:cNvPr>
+          <p:cNvSpPr txBox="1"/>
+          <p:nvPr/>
+        </p:nvSpPr>
+        <p:spPr>
+          <a:xfrm>
+            <a:off x="2232837" y="4788687"/>
+            <a:ext cx="6911163" cy="307777"/>
+          </a:xfrm>
+          <a:prstGeom prst="rect">
+            <a:avLst/>
+          </a:prstGeom>
+          <a:noFill/>
+        </p:spPr>
+        <p:txBody>
+          <a:bodyPr wrap="square">
+            <a:spAutoFit/>
+          </a:bodyPr>
+          <a:lstStyle/>
+          <a:p>
+            <a:pPr lvl="0" algn="ctr"/>
+            <a:r>
+              <a:rPr lang="en-US" sz="1400" dirty="0">
+                <a:latin typeface="Roboto"/>
+                <a:ea typeface="Roboto"/>
+                <a:cs typeface="Roboto"/>
+                <a:sym typeface="Roboto"/>
+              </a:rPr>
+              <a:t>Image of Monitor: </a:t>
+            </a:r>
+            <a:r>
+              <a:rPr lang="en-US" sz="1400" dirty="0">
+                <a:latin typeface="Roboto"/>
+                <a:ea typeface="Roboto"/>
+                <a:cs typeface="Roboto"/>
+                <a:sym typeface="Roboto"/>
+                <a:hlinkClick r:id="rId4"/>
+              </a:rPr>
+              <a:t>Monitor Screen Flat LCD Black Drawing</a:t>
+            </a:r>
+            <a:r>
+              <a:rPr lang="en-US" sz="1400" dirty="0">
+                <a:latin typeface="Roboto"/>
+                <a:ea typeface="Roboto"/>
+                <a:cs typeface="Roboto"/>
+                <a:sym typeface="Roboto"/>
+              </a:rPr>
+              <a:t> is in the public domain.</a:t>
+            </a:r>
+          </a:p>
+        </p:txBody>
+      </p:sp>
     </p:spTree>
   </p:cSld>
   <p:clrMapOvr>
@@ -8188,6 +8345,66 @@
           </a:ln>
         </p:spPr>
       </p:pic>
+      <p:sp>
+        <p:nvSpPr>
+          <p:cNvPr id="5" name="TextBox 4">
+            <a:extLst>
+              <a:ext uri="{FF2B5EF4-FFF2-40B4-BE49-F238E27FC236}">
+                <a16:creationId xmlns:a16="http://schemas.microsoft.com/office/drawing/2014/main" id="{528C7722-3037-4A0E-8545-D50BEA32A002}"/>
+              </a:ext>
+            </a:extLst>
+          </p:cNvPr>
+          <p:cNvSpPr txBox="1"/>
+          <p:nvPr/>
+        </p:nvSpPr>
+        <p:spPr>
+          <a:xfrm>
+            <a:off x="2232837" y="4788687"/>
+            <a:ext cx="6911163" cy="307777"/>
+          </a:xfrm>
+          <a:prstGeom prst="rect">
+            <a:avLst/>
+          </a:prstGeom>
+          <a:noFill/>
+        </p:spPr>
+        <p:txBody>
+          <a:bodyPr wrap="square">
+            <a:spAutoFit/>
+          </a:bodyPr>
+          <a:lstStyle/>
+          <a:p>
+            <a:pPr lvl="0" algn="ctr"/>
+            <a:r>
+              <a:rPr lang="en-US" sz="1400" dirty="0">
+                <a:latin typeface="Roboto"/>
+                <a:ea typeface="Roboto"/>
+                <a:cs typeface="Roboto"/>
+                <a:sym typeface="Roboto"/>
+              </a:rPr>
+              <a:t>Image of Monitor: </a:t>
+            </a:r>
+            <a:r>
+              <a:rPr lang="en-US" sz="1400" dirty="0">
+                <a:latin typeface="Roboto"/>
+                <a:ea typeface="Roboto"/>
+                <a:cs typeface="Roboto"/>
+                <a:sym typeface="Roboto"/>
+                <a:hlinkClick r:id="rId4"/>
+              </a:rPr>
+              <a:t>Monitor Screen Flat LCD Black Drawing</a:t>
+            </a:r>
+            <a:r>
+              <a:rPr lang="en-US" sz="1400" dirty="0">
+                <a:latin typeface="Roboto"/>
+                <a:ea typeface="Roboto"/>
+                <a:cs typeface="Roboto"/>
+                <a:sym typeface="Roboto"/>
+              </a:rPr>
+              <a:t> is in the public domain.</a:t>
+            </a:r>
+          </a:p>
+        </p:txBody>
+      </p:sp>
     </p:spTree>
   </p:cSld>
   <p:clrMapOvr>

</xml_diff>